<commit_message>
add references to slides
</commit_message>
<xml_diff>
--- a/Presentation_INFO6850.pptx
+++ b/Presentation_INFO6850.pptx
@@ -8,6 +8,7 @@
     <p:sldId id="257" r:id="rId2"/>
     <p:sldId id="258" r:id="rId3"/>
     <p:sldId id="261" r:id="rId4"/>
+    <p:sldId id="262" r:id="rId5"/>
   </p:sldIdLst>
   <p:sldSz cx="12192000" cy="6858000"/>
   <p:notesSz cx="6858000" cy="9144000"/>
@@ -934,8 +935,8 @@
         </a:p>
       </dgm:t>
     </dgm:pt>
-    <mc:AlternateContent xmlns:mc="http://schemas.openxmlformats.org/markup-compatibility/2006">
-      <mc:Choice xmlns:a14="http://schemas.microsoft.com/office/drawing/2010/main" Requires="a14">
+    <mc:AlternateContent xmlns:mc="http://schemas.openxmlformats.org/markup-compatibility/2006" xmlns:a14="http://schemas.microsoft.com/office/drawing/2010/main">
+      <mc:Choice Requires="a14">
         <dgm:pt modelId="{60D309A6-524F-6F4F-8F5F-1793751A4F34}">
           <dgm:prSet phldrT="[Text]" custT="1">
             <dgm:style>
@@ -1039,7 +1040,7 @@
           </dgm:t>
         </dgm:pt>
       </mc:Choice>
-      <mc:Fallback>
+      <mc:Fallback xmlns="">
         <dgm:pt modelId="{60D309A6-524F-6F4F-8F5F-1793751A4F34}">
           <dgm:prSet phldrT="[Text]" custT="1">
             <dgm:style>
@@ -1110,8 +1111,8 @@
         </a:p>
       </dgm:t>
     </dgm:pt>
-    <mc:AlternateContent xmlns:mc="http://schemas.openxmlformats.org/markup-compatibility/2006">
-      <mc:Choice xmlns:a14="http://schemas.microsoft.com/office/drawing/2010/main" Requires="a14">
+    <mc:AlternateContent xmlns:mc="http://schemas.openxmlformats.org/markup-compatibility/2006" xmlns:a14="http://schemas.microsoft.com/office/drawing/2010/main">
+      <mc:Choice Requires="a14">
         <dgm:pt modelId="{23921C2F-65E6-E44B-BAD2-588C9B88B82A}">
           <dgm:prSet phldrT="[Text]" custT="1">
             <dgm:style>
@@ -1329,7 +1330,7 @@
           </dgm:t>
         </dgm:pt>
       </mc:Choice>
-      <mc:Fallback>
+      <mc:Fallback xmlns="">
         <dgm:pt modelId="{23921C2F-65E6-E44B-BAD2-588C9B88B82A}">
           <dgm:prSet phldrT="[Text]" custT="1">
             <dgm:style>
@@ -3842,7 +3843,7 @@
           <a:p>
             <a:fld id="{DD7EF6B6-88E3-B649-A4F9-8BD3FED8F32F}" type="datetimeFigureOut">
               <a:rPr lang="en-US" smtClean="0"/>
-              <a:t>4/29/23</a:t>
+              <a:t>4/30/23</a:t>
             </a:fld>
             <a:endParaRPr lang="en-US"/>
           </a:p>
@@ -4040,7 +4041,7 @@
           <a:p>
             <a:fld id="{DD7EF6B6-88E3-B649-A4F9-8BD3FED8F32F}" type="datetimeFigureOut">
               <a:rPr lang="en-US" smtClean="0"/>
-              <a:t>4/29/23</a:t>
+              <a:t>4/30/23</a:t>
             </a:fld>
             <a:endParaRPr lang="en-US"/>
           </a:p>
@@ -4248,7 +4249,7 @@
           <a:p>
             <a:fld id="{DD7EF6B6-88E3-B649-A4F9-8BD3FED8F32F}" type="datetimeFigureOut">
               <a:rPr lang="en-US" smtClean="0"/>
-              <a:t>4/29/23</a:t>
+              <a:t>4/30/23</a:t>
             </a:fld>
             <a:endParaRPr lang="en-US"/>
           </a:p>
@@ -4446,7 +4447,7 @@
           <a:p>
             <a:fld id="{DD7EF6B6-88E3-B649-A4F9-8BD3FED8F32F}" type="datetimeFigureOut">
               <a:rPr lang="en-US" smtClean="0"/>
-              <a:t>4/29/23</a:t>
+              <a:t>4/30/23</a:t>
             </a:fld>
             <a:endParaRPr lang="en-US"/>
           </a:p>
@@ -4721,7 +4722,7 @@
           <a:p>
             <a:fld id="{DD7EF6B6-88E3-B649-A4F9-8BD3FED8F32F}" type="datetimeFigureOut">
               <a:rPr lang="en-US" smtClean="0"/>
-              <a:t>4/29/23</a:t>
+              <a:t>4/30/23</a:t>
             </a:fld>
             <a:endParaRPr lang="en-US"/>
           </a:p>
@@ -4986,7 +4987,7 @@
           <a:p>
             <a:fld id="{DD7EF6B6-88E3-B649-A4F9-8BD3FED8F32F}" type="datetimeFigureOut">
               <a:rPr lang="en-US" smtClean="0"/>
-              <a:t>4/29/23</a:t>
+              <a:t>4/30/23</a:t>
             </a:fld>
             <a:endParaRPr lang="en-US"/>
           </a:p>
@@ -5398,7 +5399,7 @@
           <a:p>
             <a:fld id="{DD7EF6B6-88E3-B649-A4F9-8BD3FED8F32F}" type="datetimeFigureOut">
               <a:rPr lang="en-US" smtClean="0"/>
-              <a:t>4/29/23</a:t>
+              <a:t>4/30/23</a:t>
             </a:fld>
             <a:endParaRPr lang="en-US"/>
           </a:p>
@@ -5539,7 +5540,7 @@
           <a:p>
             <a:fld id="{DD7EF6B6-88E3-B649-A4F9-8BD3FED8F32F}" type="datetimeFigureOut">
               <a:rPr lang="en-US" smtClean="0"/>
-              <a:t>4/29/23</a:t>
+              <a:t>4/30/23</a:t>
             </a:fld>
             <a:endParaRPr lang="en-US"/>
           </a:p>
@@ -5652,7 +5653,7 @@
           <a:p>
             <a:fld id="{DD7EF6B6-88E3-B649-A4F9-8BD3FED8F32F}" type="datetimeFigureOut">
               <a:rPr lang="en-US" smtClean="0"/>
-              <a:t>4/29/23</a:t>
+              <a:t>4/30/23</a:t>
             </a:fld>
             <a:endParaRPr lang="en-US"/>
           </a:p>
@@ -5963,7 +5964,7 @@
           <a:p>
             <a:fld id="{DD7EF6B6-88E3-B649-A4F9-8BD3FED8F32F}" type="datetimeFigureOut">
               <a:rPr lang="en-US" smtClean="0"/>
-              <a:t>4/29/23</a:t>
+              <a:t>4/30/23</a:t>
             </a:fld>
             <a:endParaRPr lang="en-US"/>
           </a:p>
@@ -6251,7 +6252,7 @@
           <a:p>
             <a:fld id="{DD7EF6B6-88E3-B649-A4F9-8BD3FED8F32F}" type="datetimeFigureOut">
               <a:rPr lang="en-US" smtClean="0"/>
-              <a:t>4/29/23</a:t>
+              <a:t>4/30/23</a:t>
             </a:fld>
             <a:endParaRPr lang="en-US"/>
           </a:p>
@@ -6492,7 +6493,7 @@
           <a:p>
             <a:fld id="{DD7EF6B6-88E3-B649-A4F9-8BD3FED8F32F}" type="datetimeFigureOut">
               <a:rPr lang="en-US" smtClean="0"/>
-              <a:t>4/29/23</a:t>
+              <a:t>4/30/23</a:t>
             </a:fld>
             <a:endParaRPr lang="en-US"/>
           </a:p>
@@ -7394,8 +7395,8 @@
           </a:p>
         </p:txBody>
       </p:sp>
-      <mc:AlternateContent xmlns:mc="http://schemas.openxmlformats.org/markup-compatibility/2006">
-        <mc:Choice xmlns:a14="http://schemas.microsoft.com/office/drawing/2010/main" Requires="a14">
+      <mc:AlternateContent xmlns:mc="http://schemas.openxmlformats.org/markup-compatibility/2006" xmlns:a14="http://schemas.microsoft.com/office/drawing/2010/main">
+        <mc:Choice Requires="a14">
           <p:sp>
             <p:nvSpPr>
               <p:cNvPr id="5" name="TextBox 4">
@@ -7646,7 +7647,7 @@
             </p:txBody>
           </p:sp>
         </mc:Choice>
-        <mc:Fallback>
+        <mc:Fallback xmlns="">
           <p:sp>
             <p:nvSpPr>
               <p:cNvPr id="5" name="TextBox 4">
@@ -7738,8 +7739,8 @@
           </a:p>
         </p:txBody>
       </p:sp>
-      <mc:AlternateContent xmlns:mc="http://schemas.openxmlformats.org/markup-compatibility/2006">
-        <mc:Choice xmlns:a14="http://schemas.microsoft.com/office/drawing/2010/main" Requires="a14">
+      <mc:AlternateContent xmlns:mc="http://schemas.openxmlformats.org/markup-compatibility/2006" xmlns:a14="http://schemas.microsoft.com/office/drawing/2010/main">
+        <mc:Choice Requires="a14">
           <p:graphicFrame>
             <p:nvGraphicFramePr>
               <p:cNvPr id="7" name="Diagram 6">
@@ -7769,7 +7770,7 @@
             </a:graphic>
           </p:graphicFrame>
         </mc:Choice>
-        <mc:Fallback>
+        <mc:Fallback xmlns="">
           <p:graphicFrame>
             <p:nvGraphicFramePr>
               <p:cNvPr id="7" name="Diagram 6">
@@ -7794,7 +7795,7 @@
             </p:xfrm>
             <a:graphic>
               <a:graphicData uri="http://schemas.openxmlformats.org/drawingml/2006/diagram">
-                <dgm:relIds xmlns:dgm="http://schemas.openxmlformats.org/drawingml/2006/diagram" xmlns:r="http://schemas.openxmlformats.org/officeDocument/2006/relationships" r:dm="rId8" r:lo="rId4" r:qs="rId5" r:cs="rId6"/>
+                <dgm:relIds xmlns:dgm="http://schemas.openxmlformats.org/drawingml/2006/diagram" xmlns:r="http://schemas.openxmlformats.org/officeDocument/2006/relationships" r:dm="rId8" r:lo="rId9" r:qs="rId10" r:cs="rId11"/>
               </a:graphicData>
             </a:graphic>
           </p:graphicFrame>
@@ -8009,8 +8010,8 @@
           </a:p>
         </p:txBody>
       </p:sp>
-      <mc:AlternateContent xmlns:mc="http://schemas.openxmlformats.org/markup-compatibility/2006">
-        <mc:Choice xmlns:a14="http://schemas.microsoft.com/office/drawing/2010/main" Requires="a14">
+      <mc:AlternateContent xmlns:mc="http://schemas.openxmlformats.org/markup-compatibility/2006" xmlns:a14="http://schemas.microsoft.com/office/drawing/2010/main">
+        <mc:Choice Requires="a14">
           <p:sp>
             <p:nvSpPr>
               <p:cNvPr id="5" name="TextBox 4">
@@ -8385,7 +8386,7 @@
             </p:txBody>
           </p:sp>
         </mc:Choice>
-        <mc:Fallback>
+        <mc:Fallback xmlns="">
           <p:sp>
             <p:nvSpPr>
               <p:cNvPr id="5" name="TextBox 4">
@@ -8673,8 +8674,8 @@
           </a:p>
         </p:txBody>
       </p:sp>
-      <mc:AlternateContent xmlns:mc="http://schemas.openxmlformats.org/markup-compatibility/2006">
-        <mc:Choice xmlns:a14="http://schemas.microsoft.com/office/drawing/2010/main" Requires="a14">
+      <mc:AlternateContent xmlns:mc="http://schemas.openxmlformats.org/markup-compatibility/2006" xmlns:a14="http://schemas.microsoft.com/office/drawing/2010/main">
+        <mc:Choice Requires="a14">
           <p:sp>
             <p:nvSpPr>
               <p:cNvPr id="15" name="Rectangle 14">
@@ -8917,7 +8918,7 @@
             </p:txBody>
           </p:sp>
         </mc:Choice>
-        <mc:Fallback>
+        <mc:Fallback xmlns="">
           <p:sp>
             <p:nvSpPr>
               <p:cNvPr id="15" name="Rectangle 14">
@@ -8966,6 +8967,339 @@
     <p:extLst>
       <p:ext uri="{BB962C8B-B14F-4D97-AF65-F5344CB8AC3E}">
         <p14:creationId xmlns:p14="http://schemas.microsoft.com/office/powerpoint/2010/main" val="165030800"/>
+      </p:ext>
+    </p:extLst>
+  </p:cSld>
+  <p:clrMapOvr>
+    <a:masterClrMapping/>
+  </p:clrMapOvr>
+</p:sld>
+</file>
+
+<file path=ppt/slides/slide4.xml><?xml version="1.0" encoding="utf-8"?>
+<p:sld xmlns:a="http://schemas.openxmlformats.org/drawingml/2006/main" xmlns:r="http://schemas.openxmlformats.org/officeDocument/2006/relationships" xmlns:p="http://schemas.openxmlformats.org/presentationml/2006/main">
+  <p:cSld>
+    <p:spTree>
+      <p:nvGrpSpPr>
+        <p:cNvPr id="1" name=""/>
+        <p:cNvGrpSpPr/>
+        <p:nvPr/>
+      </p:nvGrpSpPr>
+      <p:grpSpPr>
+        <a:xfrm>
+          <a:off x="0" y="0"/>
+          <a:ext cx="0" cy="0"/>
+          <a:chOff x="0" y="0"/>
+          <a:chExt cx="0" cy="0"/>
+        </a:xfrm>
+      </p:grpSpPr>
+      <p:sp>
+        <p:nvSpPr>
+          <p:cNvPr id="2" name="Title 1">
+            <a:extLst>
+              <a:ext uri="{FF2B5EF4-FFF2-40B4-BE49-F238E27FC236}">
+                <a16:creationId xmlns:a16="http://schemas.microsoft.com/office/drawing/2014/main" id="{D6D2FD46-3A93-3B3B-D4B5-430BCAD455CC}"/>
+              </a:ext>
+            </a:extLst>
+          </p:cNvPr>
+          <p:cNvSpPr>
+            <a:spLocks noGrp="1"/>
+          </p:cNvSpPr>
+          <p:nvPr>
+            <p:ph type="title"/>
+          </p:nvPr>
+        </p:nvSpPr>
+        <p:spPr>
+          <a:xfrm>
+            <a:off x="838200" y="312025"/>
+            <a:ext cx="10515600" cy="1325563"/>
+          </a:xfrm>
+        </p:spPr>
+        <p:txBody>
+          <a:bodyPr/>
+          <a:lstStyle/>
+          <a:p>
+            <a:r>
+              <a:rPr lang="en-US" dirty="0"/>
+              <a:t>References</a:t>
+            </a:r>
+          </a:p>
+        </p:txBody>
+      </p:sp>
+      <p:cxnSp>
+        <p:nvCxnSpPr>
+          <p:cNvPr id="14" name="Straight Connector 13">
+            <a:extLst>
+              <a:ext uri="{FF2B5EF4-FFF2-40B4-BE49-F238E27FC236}">
+                <a16:creationId xmlns:a16="http://schemas.microsoft.com/office/drawing/2014/main" id="{E74ACA4E-B51C-DF61-22C7-40DE0EA00C9F}"/>
+              </a:ext>
+            </a:extLst>
+          </p:cNvPr>
+          <p:cNvCxnSpPr>
+            <a:cxnSpLocks/>
+          </p:cNvCxnSpPr>
+          <p:nvPr/>
+        </p:nvCxnSpPr>
+        <p:spPr>
+          <a:xfrm>
+            <a:off x="948267" y="1332645"/>
+            <a:ext cx="10690577" cy="0"/>
+          </a:xfrm>
+          <a:prstGeom prst="line">
+            <a:avLst/>
+          </a:prstGeom>
+        </p:spPr>
+        <p:style>
+          <a:lnRef idx="2">
+            <a:schemeClr val="accent2"/>
+          </a:lnRef>
+          <a:fillRef idx="0">
+            <a:schemeClr val="accent2"/>
+          </a:fillRef>
+          <a:effectRef idx="1">
+            <a:schemeClr val="accent2"/>
+          </a:effectRef>
+          <a:fontRef idx="minor">
+            <a:schemeClr val="tx1"/>
+          </a:fontRef>
+        </p:style>
+      </p:cxnSp>
+      <p:sp>
+        <p:nvSpPr>
+          <p:cNvPr id="3" name="TextBox 2">
+            <a:extLst>
+              <a:ext uri="{FF2B5EF4-FFF2-40B4-BE49-F238E27FC236}">
+                <a16:creationId xmlns:a16="http://schemas.microsoft.com/office/drawing/2014/main" id="{16D31632-072C-69F1-4E63-DAE779DC544C}"/>
+              </a:ext>
+            </a:extLst>
+          </p:cNvPr>
+          <p:cNvSpPr txBox="1"/>
+          <p:nvPr/>
+        </p:nvSpPr>
+        <p:spPr>
+          <a:xfrm>
+            <a:off x="838200" y="1638287"/>
+            <a:ext cx="10690576" cy="3416320"/>
+          </a:xfrm>
+          <a:prstGeom prst="rect">
+            <a:avLst/>
+          </a:prstGeom>
+          <a:noFill/>
+        </p:spPr>
+        <p:txBody>
+          <a:bodyPr wrap="square" rtlCol="0">
+            <a:spAutoFit/>
+          </a:bodyPr>
+          <a:lstStyle/>
+          <a:p>
+            <a:r>
+              <a:rPr lang="en-US" sz="1800" dirty="0">
+                <a:effectLst/>
+                <a:latin typeface="NimbusRomNo9L"/>
+              </a:rPr>
+              <a:t>[1] Nicholas A Christakis and James H Fowler. The spread of obesity in a large social network over 32 years. </a:t>
+            </a:r>
+            <a:r>
+              <a:rPr lang="en-US" sz="1800" i="1" dirty="0">
+                <a:effectLst/>
+                <a:latin typeface="NimbusRomNo9L"/>
+              </a:rPr>
+              <a:t>New England journal of medicine</a:t>
+            </a:r>
+            <a:r>
+              <a:rPr lang="en-US" sz="1800" dirty="0">
+                <a:effectLst/>
+                <a:latin typeface="NimbusRomNo9L"/>
+              </a:rPr>
+              <a:t>, 357(4):370–379, 2007. </a:t>
+            </a:r>
+            <a:endParaRPr lang="en-US" dirty="0">
+              <a:effectLst/>
+            </a:endParaRPr>
+          </a:p>
+          <a:p>
+            <a:r>
+              <a:rPr lang="en-US" sz="1800" dirty="0">
+                <a:effectLst/>
+                <a:latin typeface="NimbusRomNo9L"/>
+              </a:rPr>
+              <a:t>[2] Aria Rezaei, </a:t>
+            </a:r>
+            <a:r>
+              <a:rPr lang="en-US" sz="1800" dirty="0" err="1">
+                <a:effectLst/>
+                <a:latin typeface="NimbusRomNo9L"/>
+              </a:rPr>
+              <a:t>Jie</a:t>
+            </a:r>
+            <a:r>
+              <a:rPr lang="en-US" sz="1800" dirty="0">
+                <a:effectLst/>
+                <a:latin typeface="NimbusRomNo9L"/>
+              </a:rPr>
+              <a:t> Gao, and Anand D </a:t>
+            </a:r>
+            <a:r>
+              <a:rPr lang="en-US" sz="1800" dirty="0" err="1">
+                <a:effectLst/>
+                <a:latin typeface="NimbusRomNo9L"/>
+              </a:rPr>
+              <a:t>Sarwate</a:t>
+            </a:r>
+            <a:r>
+              <a:rPr lang="en-US" sz="1800" dirty="0">
+                <a:effectLst/>
+                <a:latin typeface="NimbusRomNo9L"/>
+              </a:rPr>
+              <a:t>. Influencers and the giant component: the </a:t>
+            </a:r>
+            <a:r>
+              <a:rPr lang="en-US" sz="1800" dirty="0" err="1">
+                <a:effectLst/>
+                <a:latin typeface="NimbusRomNo9L"/>
+              </a:rPr>
+              <a:t>funda</a:t>
+            </a:r>
+            <a:r>
+              <a:rPr lang="en-US" sz="1800" dirty="0">
+                <a:effectLst/>
+                <a:latin typeface="NimbusRomNo9L"/>
+              </a:rPr>
+              <a:t>- mental hardness in privacy protection for socially contagious attributes. In </a:t>
+            </a:r>
+            <a:r>
+              <a:rPr lang="en-US" sz="1800" i="1" dirty="0">
+                <a:effectLst/>
+                <a:latin typeface="NimbusRomNo9L"/>
+              </a:rPr>
+              <a:t>Proceedings of the 2021 SIAM International Conference on Data Mining (SDM)</a:t>
+            </a:r>
+            <a:r>
+              <a:rPr lang="en-US" sz="1800" dirty="0">
+                <a:effectLst/>
+                <a:latin typeface="NimbusRomNo9L"/>
+              </a:rPr>
+              <a:t>, pages 217–225. SIAM, 2021. </a:t>
+            </a:r>
+            <a:endParaRPr lang="en-US" dirty="0">
+              <a:effectLst/>
+            </a:endParaRPr>
+          </a:p>
+          <a:p>
+            <a:r>
+              <a:rPr lang="en-US" sz="1800" dirty="0">
+                <a:effectLst/>
+                <a:latin typeface="NimbusRomNo9L"/>
+              </a:rPr>
+              <a:t>[3] Daniel </a:t>
+            </a:r>
+            <a:r>
+              <a:rPr lang="en-US" sz="1800" dirty="0" err="1">
+                <a:effectLst/>
+                <a:latin typeface="NimbusRomNo9L"/>
+              </a:rPr>
+              <a:t>Kifer</a:t>
+            </a:r>
+            <a:r>
+              <a:rPr lang="en-US" sz="1800" dirty="0">
+                <a:effectLst/>
+                <a:latin typeface="NimbusRomNo9L"/>
+              </a:rPr>
+              <a:t> and Ashwin </a:t>
+            </a:r>
+            <a:r>
+              <a:rPr lang="en-US" sz="1800" dirty="0" err="1">
+                <a:effectLst/>
+                <a:latin typeface="NimbusRomNo9L"/>
+              </a:rPr>
+              <a:t>Machanavajjhala</a:t>
+            </a:r>
+            <a:r>
+              <a:rPr lang="en-US" sz="1800" dirty="0">
+                <a:effectLst/>
+                <a:latin typeface="NimbusRomNo9L"/>
+              </a:rPr>
+              <a:t>. Pufferfish: A framework for mathematical privacy definitions. </a:t>
+            </a:r>
+            <a:r>
+              <a:rPr lang="en-US" sz="1800" i="1" dirty="0">
+                <a:effectLst/>
+                <a:latin typeface="NimbusRomNo9L"/>
+              </a:rPr>
+              <a:t>ACM Transactions on Database Systems (TODS)</a:t>
+            </a:r>
+            <a:r>
+              <a:rPr lang="en-US" sz="1800" dirty="0">
+                <a:effectLst/>
+                <a:latin typeface="NimbusRomNo9L"/>
+              </a:rPr>
+              <a:t>, 39(1):1–36, 2014. </a:t>
+            </a:r>
+            <a:endParaRPr lang="en-US" dirty="0">
+              <a:effectLst/>
+            </a:endParaRPr>
+          </a:p>
+          <a:p>
+            <a:r>
+              <a:rPr lang="en-US" sz="1800" dirty="0">
+                <a:effectLst/>
+                <a:latin typeface="NimbusRomNo9L"/>
+              </a:rPr>
+              <a:t>[4] Duncan J Watts. A simple model of global cascades on random networks. </a:t>
+            </a:r>
+            <a:r>
+              <a:rPr lang="en-US" sz="1800" i="1" dirty="0">
+                <a:effectLst/>
+                <a:latin typeface="NimbusRomNo9L"/>
+              </a:rPr>
+              <a:t>Proceedings of the National Academy of Sciences</a:t>
+            </a:r>
+            <a:r>
+              <a:rPr lang="en-US" sz="1800" dirty="0">
+                <a:effectLst/>
+                <a:latin typeface="NimbusRomNo9L"/>
+              </a:rPr>
+              <a:t>, 99(9):5766–5771, 2002. </a:t>
+            </a:r>
+            <a:endParaRPr lang="en-US" dirty="0">
+              <a:effectLst/>
+            </a:endParaRPr>
+          </a:p>
+          <a:p>
+            <a:r>
+              <a:rPr lang="en-US" sz="1800" dirty="0">
+                <a:effectLst/>
+                <a:latin typeface="NimbusRomNo9L"/>
+              </a:rPr>
+              <a:t>[5] David Easley and Jon Kleinberg. </a:t>
+            </a:r>
+            <a:r>
+              <a:rPr lang="en-US" sz="1800" i="1" dirty="0">
+                <a:effectLst/>
+                <a:latin typeface="NimbusRomNo9L"/>
+              </a:rPr>
+              <a:t>Networks, crowds, and markets: Reasoning about a highly connected world</a:t>
+            </a:r>
+            <a:r>
+              <a:rPr lang="en-US" sz="1800" dirty="0">
+                <a:effectLst/>
+                <a:latin typeface="NimbusRomNo9L"/>
+              </a:rPr>
+              <a:t>. Cambridge university press, 2010. </a:t>
+            </a:r>
+            <a:endParaRPr lang="en-US" dirty="0">
+              <a:effectLst/>
+            </a:endParaRPr>
+          </a:p>
+          <a:p>
+            <a:endParaRPr lang="en-US" dirty="0"/>
+          </a:p>
+        </p:txBody>
+      </p:sp>
+    </p:spTree>
+    <p:extLst>
+      <p:ext uri="{BB962C8B-B14F-4D97-AF65-F5344CB8AC3E}">
+        <p14:creationId xmlns:p14="http://schemas.microsoft.com/office/powerpoint/2010/main" val="2594876175"/>
       </p:ext>
     </p:extLst>
   </p:cSld>

</xml_diff>